<commit_message>
ready to remove weekly labeling
</commit_message>
<xml_diff>
--- a/Machine learning to predict clinical outcomes from RNS background ECoG.pptx
+++ b/Machine learning to predict clinical outcomes from RNS background ECoG.pptx
@@ -246,7 +246,7 @@
           <a:p>
             <a:fld id="{7495F055-7986-3641-A733-961FAB9DF933}" type="datetimeFigureOut">
               <a:rPr lang="en-US" smtClean="0"/>
-              <a:t>11/9/18</a:t>
+              <a:t>11/14/18</a:t>
             </a:fld>
             <a:endParaRPr lang="en-US"/>
           </a:p>
@@ -1878,18 +1878,55 @@
           <a:bodyPr/>
           <a:lstStyle/>
           <a:p>
-            <a:r>
-              <a:rPr lang="en-US"/>
+            <a:pPr marL="0" marR="0" lvl="0" indent="0" algn="l" defTabSz="914400" rtl="0" eaLnBrk="1" fontAlgn="auto" latinLnBrk="0" hangingPunct="1">
+              <a:lnSpc>
+                <a:spcPct val="100000"/>
+              </a:lnSpc>
+              <a:spcBef>
+                <a:spcPts val="0"/>
+              </a:spcBef>
+              <a:spcAft>
+                <a:spcPts val="0"/>
+              </a:spcAft>
+              <a:buClrTx/>
+              <a:buSzTx/>
+              <a:buFontTx/>
+              <a:buNone/>
+              <a:tabLst/>
+              <a:defRPr/>
+            </a:pPr>
+            <a:r>
+              <a:rPr lang="en-US" sz="1200" kern="1200" dirty="0">
+                <a:solidFill>
+                  <a:schemeClr val="tx1"/>
+                </a:solidFill>
+                <a:effectLst/>
+                <a:latin typeface="+mn-lt"/>
+                <a:ea typeface="+mn-ea"/>
+                <a:cs typeface="+mn-cs"/>
+              </a:rPr>
+              <a:t>1) takes weeks to months to know new seizure frequency, 2) waits another 2-3 months before being informed by patient him/herself when meeting in person</a:t>
+            </a:r>
+          </a:p>
+          <a:p>
+            <a:endParaRPr lang="en-US" dirty="0"/>
+          </a:p>
+          <a:p>
+            <a:endParaRPr lang="en-US" dirty="0"/>
+          </a:p>
+          <a:p>
+            <a:r>
+              <a:rPr lang="en-US" dirty="0"/>
               <a:t>Let’s first talk about some backgrounds and what’s the problem we are trying to solve here with RNS device?</a:t>
             </a:r>
           </a:p>
           <a:p>
             <a:r>
-              <a:rPr lang="en-US"/>
+              <a:rPr lang="en-US" dirty="0"/>
               <a:t>RNS device </a:t>
             </a:r>
             <a:r>
-              <a:rPr lang="en-US" sz="1200" b="0" i="0" kern="1200">
+              <a:rPr lang="en-US" sz="1200" b="0" i="0" kern="1200" dirty="0">
                 <a:solidFill>
                   <a:schemeClr val="tx1"/>
                 </a:solidFill>
@@ -1901,37 +1938,37 @@
               <a:t>is a brain-responsive neurostimulation system designed to prevent epileptic seizures at their source.</a:t>
             </a:r>
             <a:r>
-              <a:rPr lang="en-US" baseline="0"/>
+              <a:rPr lang="en-US" baseline="0" dirty="0"/>
               <a:t> The physicians who routinely examined the output from patients’ RNS device will adjust the parameter of the device according to the physician’s experience. The problem of this practice is that  physicians usually need to wait a long period of time (~2-3 months) to get an idea of whether the adjustments they made to the device has improved or worsened the patient’s condition. We can see that the RNS parameter optimization is a long and slow process.</a:t>
             </a:r>
           </a:p>
           <a:p>
             <a:r>
-              <a:rPr lang="en-US" baseline="0"/>
+              <a:rPr lang="en-US" baseline="0" dirty="0"/>
               <a:t>Why does physicians need to wait so long. </a:t>
             </a:r>
           </a:p>
           <a:p>
-            <a:endParaRPr lang="en-US"/>
-          </a:p>
-          <a:p>
-            <a:r>
-              <a:rPr lang="en-US"/>
+            <a:endParaRPr lang="en-US" dirty="0"/>
+          </a:p>
+          <a:p>
+            <a:r>
+              <a:rPr lang="en-US" dirty="0"/>
               <a:t>Although seizures are the ultimate</a:t>
             </a:r>
             <a:r>
-              <a:rPr lang="en-US" baseline="0"/>
+              <a:rPr lang="en-US" baseline="0" dirty="0"/>
               <a:t> indication of clinical outcome, a long time duration is required to reliably estimate seizure occurrence frequency during that given period of time</a:t>
             </a:r>
           </a:p>
           <a:p>
             <a:r>
-              <a:rPr lang="en-US" baseline="0"/>
+              <a:rPr lang="en-US" baseline="0" dirty="0"/>
               <a:t>Also, physicians only hear about how the patient has been doing when meeting with them in person every ~3 months, it would be nice to have tools that generate more frequent quantifications of patients’ epileptic activity directly based on their EEG data</a:t>
             </a:r>
           </a:p>
           <a:p>
-            <a:endParaRPr lang="en-US"/>
+            <a:endParaRPr lang="en-US" dirty="0"/>
           </a:p>
         </p:txBody>
       </p:sp>
@@ -3932,7 +3969,7 @@
             <a:fld id="{1D8BD707-D9CF-40AE-B4C6-C98DA3205C09}" type="datetimeFigureOut">
               <a:rPr lang="en-US" smtClean="0"/>
               <a:pPr/>
-              <a:t>11/9/18</a:t>
+              <a:t>11/14/18</a:t>
             </a:fld>
             <a:endParaRPr lang="en-US"/>
           </a:p>
@@ -4097,7 +4134,7 @@
             <a:fld id="{1D8BD707-D9CF-40AE-B4C6-C98DA3205C09}" type="datetimeFigureOut">
               <a:rPr lang="en-US" smtClean="0"/>
               <a:pPr/>
-              <a:t>11/9/18</a:t>
+              <a:t>11/14/18</a:t>
             </a:fld>
             <a:endParaRPr lang="en-US"/>
           </a:p>
@@ -4272,7 +4309,7 @@
             <a:fld id="{1D8BD707-D9CF-40AE-B4C6-C98DA3205C09}" type="datetimeFigureOut">
               <a:rPr lang="en-US" smtClean="0"/>
               <a:pPr/>
-              <a:t>11/9/18</a:t>
+              <a:t>11/14/18</a:t>
             </a:fld>
             <a:endParaRPr lang="en-US"/>
           </a:p>
@@ -4437,7 +4474,7 @@
             <a:fld id="{1D8BD707-D9CF-40AE-B4C6-C98DA3205C09}" type="datetimeFigureOut">
               <a:rPr lang="en-US" smtClean="0"/>
               <a:pPr/>
-              <a:t>11/9/18</a:t>
+              <a:t>11/14/18</a:t>
             </a:fld>
             <a:endParaRPr lang="en-US"/>
           </a:p>
@@ -4679,7 +4716,7 @@
             <a:fld id="{1D8BD707-D9CF-40AE-B4C6-C98DA3205C09}" type="datetimeFigureOut">
               <a:rPr lang="en-US" smtClean="0"/>
               <a:pPr/>
-              <a:t>11/9/18</a:t>
+              <a:t>11/14/18</a:t>
             </a:fld>
             <a:endParaRPr lang="en-US"/>
           </a:p>
@@ -4961,7 +4998,7 @@
             <a:fld id="{1D8BD707-D9CF-40AE-B4C6-C98DA3205C09}" type="datetimeFigureOut">
               <a:rPr lang="en-US" smtClean="0"/>
               <a:pPr/>
-              <a:t>11/9/18</a:t>
+              <a:t>11/14/18</a:t>
             </a:fld>
             <a:endParaRPr lang="en-US"/>
           </a:p>
@@ -5377,7 +5414,7 @@
             <a:fld id="{1D8BD707-D9CF-40AE-B4C6-C98DA3205C09}" type="datetimeFigureOut">
               <a:rPr lang="en-US" smtClean="0"/>
               <a:pPr/>
-              <a:t>11/9/18</a:t>
+              <a:t>11/14/18</a:t>
             </a:fld>
             <a:endParaRPr lang="en-US"/>
           </a:p>
@@ -5491,7 +5528,7 @@
             <a:fld id="{1D8BD707-D9CF-40AE-B4C6-C98DA3205C09}" type="datetimeFigureOut">
               <a:rPr lang="en-US" smtClean="0"/>
               <a:pPr/>
-              <a:t>11/9/18</a:t>
+              <a:t>11/14/18</a:t>
             </a:fld>
             <a:endParaRPr lang="en-US"/>
           </a:p>
@@ -5583,7 +5620,7 @@
             <a:fld id="{1D8BD707-D9CF-40AE-B4C6-C98DA3205C09}" type="datetimeFigureOut">
               <a:rPr lang="en-US" smtClean="0"/>
               <a:pPr/>
-              <a:t>11/9/18</a:t>
+              <a:t>11/14/18</a:t>
             </a:fld>
             <a:endParaRPr lang="en-US"/>
           </a:p>
@@ -5855,7 +5892,7 @@
             <a:fld id="{1D8BD707-D9CF-40AE-B4C6-C98DA3205C09}" type="datetimeFigureOut">
               <a:rPr lang="en-US" smtClean="0"/>
               <a:pPr/>
-              <a:t>11/9/18</a:t>
+              <a:t>11/14/18</a:t>
             </a:fld>
             <a:endParaRPr lang="en-US"/>
           </a:p>
@@ -6104,7 +6141,7 @@
             <a:fld id="{1D8BD707-D9CF-40AE-B4C6-C98DA3205C09}" type="datetimeFigureOut">
               <a:rPr lang="en-US" smtClean="0"/>
               <a:pPr/>
-              <a:t>11/9/18</a:t>
+              <a:t>11/14/18</a:t>
             </a:fld>
             <a:endParaRPr lang="en-US"/>
           </a:p>
@@ -6312,7 +6349,7 @@
             <a:fld id="{1D8BD707-D9CF-40AE-B4C6-C98DA3205C09}" type="datetimeFigureOut">
               <a:rPr lang="en-US" smtClean="0"/>
               <a:pPr/>
-              <a:t>11/9/18</a:t>
+              <a:t>11/14/18</a:t>
             </a:fld>
             <a:endParaRPr lang="en-US"/>
           </a:p>

</xml_diff>